<commit_message>
Added bar_labels to part_a Changed coloring on figure_c text in part_c
</commit_message>
<xml_diff>
--- a/Data/Summary.pptx
+++ b/Data/Summary.pptx
@@ -104,6 +104,11 @@
       </a:defRPr>
     </a:lvl9pPr>
   </p:defaultTextStyle>
+  <p:extLst>
+    <p:ext uri="{EFAFB233-063F-42B5-8137-9DF3F51BA10A}">
+      <p15:sldGuideLst xmlns:p15="http://schemas.microsoft.com/office/powerpoint/2012/main"/>
+    </p:ext>
+  </p:extLst>
 </p:presentation>
 </file>
 
@@ -256,7 +261,7 @@
           <a:p>
             <a:fld id="{4518B2FB-D50C-4C48-8D4B-F5DFF5AC2B4F}" type="datetimeFigureOut">
               <a:rPr lang="en-GB" smtClean="0"/>
-              <a:t>25/11/2022</a:t>
+              <a:t>26/11/2022</a:t>
             </a:fld>
             <a:endParaRPr lang="en-GB"/>
           </a:p>
@@ -456,7 +461,7 @@
           <a:p>
             <a:fld id="{4518B2FB-D50C-4C48-8D4B-F5DFF5AC2B4F}" type="datetimeFigureOut">
               <a:rPr lang="en-GB" smtClean="0"/>
-              <a:t>25/11/2022</a:t>
+              <a:t>26/11/2022</a:t>
             </a:fld>
             <a:endParaRPr lang="en-GB"/>
           </a:p>
@@ -666,7 +671,7 @@
           <a:p>
             <a:fld id="{4518B2FB-D50C-4C48-8D4B-F5DFF5AC2B4F}" type="datetimeFigureOut">
               <a:rPr lang="en-GB" smtClean="0"/>
-              <a:t>25/11/2022</a:t>
+              <a:t>26/11/2022</a:t>
             </a:fld>
             <a:endParaRPr lang="en-GB"/>
           </a:p>
@@ -866,7 +871,7 @@
           <a:p>
             <a:fld id="{4518B2FB-D50C-4C48-8D4B-F5DFF5AC2B4F}" type="datetimeFigureOut">
               <a:rPr lang="en-GB" smtClean="0"/>
-              <a:t>25/11/2022</a:t>
+              <a:t>26/11/2022</a:t>
             </a:fld>
             <a:endParaRPr lang="en-GB"/>
           </a:p>
@@ -1142,7 +1147,7 @@
           <a:p>
             <a:fld id="{4518B2FB-D50C-4C48-8D4B-F5DFF5AC2B4F}" type="datetimeFigureOut">
               <a:rPr lang="en-GB" smtClean="0"/>
-              <a:t>25/11/2022</a:t>
+              <a:t>26/11/2022</a:t>
             </a:fld>
             <a:endParaRPr lang="en-GB"/>
           </a:p>
@@ -1410,7 +1415,7 @@
           <a:p>
             <a:fld id="{4518B2FB-D50C-4C48-8D4B-F5DFF5AC2B4F}" type="datetimeFigureOut">
               <a:rPr lang="en-GB" smtClean="0"/>
-              <a:t>25/11/2022</a:t>
+              <a:t>26/11/2022</a:t>
             </a:fld>
             <a:endParaRPr lang="en-GB"/>
           </a:p>
@@ -1825,7 +1830,7 @@
           <a:p>
             <a:fld id="{4518B2FB-D50C-4C48-8D4B-F5DFF5AC2B4F}" type="datetimeFigureOut">
               <a:rPr lang="en-GB" smtClean="0"/>
-              <a:t>25/11/2022</a:t>
+              <a:t>26/11/2022</a:t>
             </a:fld>
             <a:endParaRPr lang="en-GB"/>
           </a:p>
@@ -1967,7 +1972,7 @@
           <a:p>
             <a:fld id="{4518B2FB-D50C-4C48-8D4B-F5DFF5AC2B4F}" type="datetimeFigureOut">
               <a:rPr lang="en-GB" smtClean="0"/>
-              <a:t>25/11/2022</a:t>
+              <a:t>26/11/2022</a:t>
             </a:fld>
             <a:endParaRPr lang="en-GB"/>
           </a:p>
@@ -2080,7 +2085,7 @@
           <a:p>
             <a:fld id="{4518B2FB-D50C-4C48-8D4B-F5DFF5AC2B4F}" type="datetimeFigureOut">
               <a:rPr lang="en-GB" smtClean="0"/>
-              <a:t>25/11/2022</a:t>
+              <a:t>26/11/2022</a:t>
             </a:fld>
             <a:endParaRPr lang="en-GB"/>
           </a:p>
@@ -2393,7 +2398,7 @@
           <a:p>
             <a:fld id="{4518B2FB-D50C-4C48-8D4B-F5DFF5AC2B4F}" type="datetimeFigureOut">
               <a:rPr lang="en-GB" smtClean="0"/>
-              <a:t>25/11/2022</a:t>
+              <a:t>26/11/2022</a:t>
             </a:fld>
             <a:endParaRPr lang="en-GB"/>
           </a:p>
@@ -2682,7 +2687,7 @@
           <a:p>
             <a:fld id="{4518B2FB-D50C-4C48-8D4B-F5DFF5AC2B4F}" type="datetimeFigureOut">
               <a:rPr lang="en-GB" smtClean="0"/>
-              <a:t>25/11/2022</a:t>
+              <a:t>26/11/2022</a:t>
             </a:fld>
             <a:endParaRPr lang="en-GB"/>
           </a:p>
@@ -2925,7 +2930,7 @@
           <a:p>
             <a:fld id="{4518B2FB-D50C-4C48-8D4B-F5DFF5AC2B4F}" type="datetimeFigureOut">
               <a:rPr lang="en-GB" smtClean="0"/>
-              <a:t>25/11/2022</a:t>
+              <a:t>26/11/2022</a:t>
             </a:fld>
             <a:endParaRPr lang="en-GB"/>
           </a:p>
@@ -3370,6 +3375,26 @@
           </a:bodyPr>
           <a:lstStyle/>
           <a:p>
+            <a:r>
+              <a:rPr lang="en-GB" b="1" dirty="0">
+                <a:effectLst/>
+                <a:latin typeface="Calibri" panose="020F0502020204030204" pitchFamily="34" charset="0"/>
+                <a:ea typeface="Calibri" panose="020F0502020204030204" pitchFamily="34" charset="0"/>
+                <a:cs typeface="Times New Roman" panose="02020603050405020304" pitchFamily="18" charset="0"/>
+              </a:rPr>
+              <a:t>Figure </a:t>
+            </a:r>
+            <a:r>
+              <a:rPr lang="en-GB" b="1">
+                <a:effectLst/>
+                <a:latin typeface="Calibri" panose="020F0502020204030204" pitchFamily="34" charset="0"/>
+                <a:ea typeface="Calibri" panose="020F0502020204030204" pitchFamily="34" charset="0"/>
+                <a:cs typeface="Times New Roman" panose="02020603050405020304" pitchFamily="18" charset="0"/>
+              </a:rPr>
+              <a:t>A-B-C Summaries</a:t>
+            </a:r>
+          </a:p>
+          <a:p>
             <a:pPr algn="l"/>
             <a:r>
               <a:rPr lang="en-GB" b="1" dirty="0">

</xml_diff>